<commit_message>
updated niwot and loch vale plots becuase of SWE
</commit_message>
<xml_diff>
--- a/Figures/LochVale/formatting.pptx
+++ b/Figures/LochVale/formatting.pptx
@@ -270,7 +270,7 @@
           <a:p>
             <a:fld id="{78F4CBAB-97FC-4A74-BBCB-0F18100BA447}" type="datetimeFigureOut">
               <a:rPr lang="en-US" smtClean="0"/>
-              <a:t>4/16/2024</a:t>
+              <a:t>6/10/2024</a:t>
             </a:fld>
             <a:endParaRPr lang="en-US"/>
           </a:p>
@@ -468,7 +468,7 @@
           <a:p>
             <a:fld id="{78F4CBAB-97FC-4A74-BBCB-0F18100BA447}" type="datetimeFigureOut">
               <a:rPr lang="en-US" smtClean="0"/>
-              <a:t>4/16/2024</a:t>
+              <a:t>6/10/2024</a:t>
             </a:fld>
             <a:endParaRPr lang="en-US"/>
           </a:p>
@@ -676,7 +676,7 @@
           <a:p>
             <a:fld id="{78F4CBAB-97FC-4A74-BBCB-0F18100BA447}" type="datetimeFigureOut">
               <a:rPr lang="en-US" smtClean="0"/>
-              <a:t>4/16/2024</a:t>
+              <a:t>6/10/2024</a:t>
             </a:fld>
             <a:endParaRPr lang="en-US"/>
           </a:p>
@@ -874,7 +874,7 @@
           <a:p>
             <a:fld id="{78F4CBAB-97FC-4A74-BBCB-0F18100BA447}" type="datetimeFigureOut">
               <a:rPr lang="en-US" smtClean="0"/>
-              <a:t>4/16/2024</a:t>
+              <a:t>6/10/2024</a:t>
             </a:fld>
             <a:endParaRPr lang="en-US"/>
           </a:p>
@@ -1149,7 +1149,7 @@
           <a:p>
             <a:fld id="{78F4CBAB-97FC-4A74-BBCB-0F18100BA447}" type="datetimeFigureOut">
               <a:rPr lang="en-US" smtClean="0"/>
-              <a:t>4/16/2024</a:t>
+              <a:t>6/10/2024</a:t>
             </a:fld>
             <a:endParaRPr lang="en-US"/>
           </a:p>
@@ -1414,7 +1414,7 @@
           <a:p>
             <a:fld id="{78F4CBAB-97FC-4A74-BBCB-0F18100BA447}" type="datetimeFigureOut">
               <a:rPr lang="en-US" smtClean="0"/>
-              <a:t>4/16/2024</a:t>
+              <a:t>6/10/2024</a:t>
             </a:fld>
             <a:endParaRPr lang="en-US"/>
           </a:p>
@@ -1826,7 +1826,7 @@
           <a:p>
             <a:fld id="{78F4CBAB-97FC-4A74-BBCB-0F18100BA447}" type="datetimeFigureOut">
               <a:rPr lang="en-US" smtClean="0"/>
-              <a:t>4/16/2024</a:t>
+              <a:t>6/10/2024</a:t>
             </a:fld>
             <a:endParaRPr lang="en-US"/>
           </a:p>
@@ -1967,7 +1967,7 @@
           <a:p>
             <a:fld id="{78F4CBAB-97FC-4A74-BBCB-0F18100BA447}" type="datetimeFigureOut">
               <a:rPr lang="en-US" smtClean="0"/>
-              <a:t>4/16/2024</a:t>
+              <a:t>6/10/2024</a:t>
             </a:fld>
             <a:endParaRPr lang="en-US"/>
           </a:p>
@@ -2080,7 +2080,7 @@
           <a:p>
             <a:fld id="{78F4CBAB-97FC-4A74-BBCB-0F18100BA447}" type="datetimeFigureOut">
               <a:rPr lang="en-US" smtClean="0"/>
-              <a:t>4/16/2024</a:t>
+              <a:t>6/10/2024</a:t>
             </a:fld>
             <a:endParaRPr lang="en-US"/>
           </a:p>
@@ -2391,7 +2391,7 @@
           <a:p>
             <a:fld id="{78F4CBAB-97FC-4A74-BBCB-0F18100BA447}" type="datetimeFigureOut">
               <a:rPr lang="en-US" smtClean="0"/>
-              <a:t>4/16/2024</a:t>
+              <a:t>6/10/2024</a:t>
             </a:fld>
             <a:endParaRPr lang="en-US"/>
           </a:p>
@@ -2679,7 +2679,7 @@
           <a:p>
             <a:fld id="{78F4CBAB-97FC-4A74-BBCB-0F18100BA447}" type="datetimeFigureOut">
               <a:rPr lang="en-US" smtClean="0"/>
-              <a:t>4/16/2024</a:t>
+              <a:t>6/10/2024</a:t>
             </a:fld>
             <a:endParaRPr lang="en-US"/>
           </a:p>
@@ -2920,7 +2920,7 @@
           <a:p>
             <a:fld id="{78F4CBAB-97FC-4A74-BBCB-0F18100BA447}" type="datetimeFigureOut">
               <a:rPr lang="en-US" smtClean="0"/>
-              <a:t>4/16/2024</a:t>
+              <a:t>6/10/2024</a:t>
             </a:fld>
             <a:endParaRPr lang="en-US"/>
           </a:p>
@@ -3351,10 +3351,10 @@
         </p:nvGrpSpPr>
         <p:grpSpPr>
           <a:xfrm>
-            <a:off x="245799" y="108152"/>
-            <a:ext cx="11277607" cy="6641695"/>
-            <a:chOff x="894728" y="224328"/>
-            <a:chExt cx="8025835" cy="5029210"/>
+            <a:off x="529242" y="108152"/>
+            <a:ext cx="10994165" cy="6641695"/>
+            <a:chOff x="1096443" y="224328"/>
+            <a:chExt cx="7824120" cy="5029210"/>
           </a:xfrm>
         </p:grpSpPr>
         <p:pic>
@@ -3394,8 +3394,8 @@
           </p:blipFill>
           <p:spPr>
             <a:xfrm>
-              <a:off x="894728" y="224328"/>
-              <a:ext cx="6705613" cy="5029210"/>
+              <a:off x="1096443" y="224328"/>
+              <a:ext cx="6302182" cy="5029210"/>
             </a:xfrm>
             <a:prstGeom prst="rect">
               <a:avLst/>

</xml_diff>

<commit_message>
updated figures for ms
</commit_message>
<xml_diff>
--- a/Figures/LochVale/formatting.pptx
+++ b/Figures/LochVale/formatting.pptx
@@ -270,7 +270,7 @@
           <a:p>
             <a:fld id="{78F4CBAB-97FC-4A74-BBCB-0F18100BA447}" type="datetimeFigureOut">
               <a:rPr lang="en-US" smtClean="0"/>
-              <a:t>6/10/2024</a:t>
+              <a:t>6/14/2024</a:t>
             </a:fld>
             <a:endParaRPr lang="en-US"/>
           </a:p>
@@ -468,7 +468,7 @@
           <a:p>
             <a:fld id="{78F4CBAB-97FC-4A74-BBCB-0F18100BA447}" type="datetimeFigureOut">
               <a:rPr lang="en-US" smtClean="0"/>
-              <a:t>6/10/2024</a:t>
+              <a:t>6/14/2024</a:t>
             </a:fld>
             <a:endParaRPr lang="en-US"/>
           </a:p>
@@ -676,7 +676,7 @@
           <a:p>
             <a:fld id="{78F4CBAB-97FC-4A74-BBCB-0F18100BA447}" type="datetimeFigureOut">
               <a:rPr lang="en-US" smtClean="0"/>
-              <a:t>6/10/2024</a:t>
+              <a:t>6/14/2024</a:t>
             </a:fld>
             <a:endParaRPr lang="en-US"/>
           </a:p>
@@ -874,7 +874,7 @@
           <a:p>
             <a:fld id="{78F4CBAB-97FC-4A74-BBCB-0F18100BA447}" type="datetimeFigureOut">
               <a:rPr lang="en-US" smtClean="0"/>
-              <a:t>6/10/2024</a:t>
+              <a:t>6/14/2024</a:t>
             </a:fld>
             <a:endParaRPr lang="en-US"/>
           </a:p>
@@ -1149,7 +1149,7 @@
           <a:p>
             <a:fld id="{78F4CBAB-97FC-4A74-BBCB-0F18100BA447}" type="datetimeFigureOut">
               <a:rPr lang="en-US" smtClean="0"/>
-              <a:t>6/10/2024</a:t>
+              <a:t>6/14/2024</a:t>
             </a:fld>
             <a:endParaRPr lang="en-US"/>
           </a:p>
@@ -1414,7 +1414,7 @@
           <a:p>
             <a:fld id="{78F4CBAB-97FC-4A74-BBCB-0F18100BA447}" type="datetimeFigureOut">
               <a:rPr lang="en-US" smtClean="0"/>
-              <a:t>6/10/2024</a:t>
+              <a:t>6/14/2024</a:t>
             </a:fld>
             <a:endParaRPr lang="en-US"/>
           </a:p>
@@ -1826,7 +1826,7 @@
           <a:p>
             <a:fld id="{78F4CBAB-97FC-4A74-BBCB-0F18100BA447}" type="datetimeFigureOut">
               <a:rPr lang="en-US" smtClean="0"/>
-              <a:t>6/10/2024</a:t>
+              <a:t>6/14/2024</a:t>
             </a:fld>
             <a:endParaRPr lang="en-US"/>
           </a:p>
@@ -1967,7 +1967,7 @@
           <a:p>
             <a:fld id="{78F4CBAB-97FC-4A74-BBCB-0F18100BA447}" type="datetimeFigureOut">
               <a:rPr lang="en-US" smtClean="0"/>
-              <a:t>6/10/2024</a:t>
+              <a:t>6/14/2024</a:t>
             </a:fld>
             <a:endParaRPr lang="en-US"/>
           </a:p>
@@ -2080,7 +2080,7 @@
           <a:p>
             <a:fld id="{78F4CBAB-97FC-4A74-BBCB-0F18100BA447}" type="datetimeFigureOut">
               <a:rPr lang="en-US" smtClean="0"/>
-              <a:t>6/10/2024</a:t>
+              <a:t>6/14/2024</a:t>
             </a:fld>
             <a:endParaRPr lang="en-US"/>
           </a:p>
@@ -2391,7 +2391,7 @@
           <a:p>
             <a:fld id="{78F4CBAB-97FC-4A74-BBCB-0F18100BA447}" type="datetimeFigureOut">
               <a:rPr lang="en-US" smtClean="0"/>
-              <a:t>6/10/2024</a:t>
+              <a:t>6/14/2024</a:t>
             </a:fld>
             <a:endParaRPr lang="en-US"/>
           </a:p>
@@ -2679,7 +2679,7 @@
           <a:p>
             <a:fld id="{78F4CBAB-97FC-4A74-BBCB-0F18100BA447}" type="datetimeFigureOut">
               <a:rPr lang="en-US" smtClean="0"/>
-              <a:t>6/10/2024</a:t>
+              <a:t>6/14/2024</a:t>
             </a:fld>
             <a:endParaRPr lang="en-US"/>
           </a:p>
@@ -2920,7 +2920,7 @@
           <a:p>
             <a:fld id="{78F4CBAB-97FC-4A74-BBCB-0F18100BA447}" type="datetimeFigureOut">
               <a:rPr lang="en-US" smtClean="0"/>
-              <a:t>6/10/2024</a:t>
+              <a:t>6/14/2024</a:t>
             </a:fld>
             <a:endParaRPr lang="en-US"/>
           </a:p>
@@ -3339,10 +3339,10 @@
       </p:grpSpPr>
       <p:grpSp>
         <p:nvGrpSpPr>
-          <p:cNvPr id="8" name="Group 7">
-            <a:extLst>
-              <a:ext uri="{FF2B5EF4-FFF2-40B4-BE49-F238E27FC236}">
-                <a16:creationId xmlns:a16="http://schemas.microsoft.com/office/drawing/2014/main" id="{1F06B398-46B1-BF0E-8B08-EE7D0AFD3263}"/>
+          <p:cNvPr id="3" name="Group 2">
+            <a:extLst>
+              <a:ext uri="{FF2B5EF4-FFF2-40B4-BE49-F238E27FC236}">
+                <a16:creationId xmlns:a16="http://schemas.microsoft.com/office/drawing/2014/main" id="{7D6C5F5B-7F72-AC93-E0C9-F55BED229C5C}"/>
               </a:ext>
             </a:extLst>
           </p:cNvPr>
@@ -3353,101 +3353,157 @@
           <a:xfrm>
             <a:off x="529242" y="108152"/>
             <a:ext cx="10994165" cy="6641695"/>
-            <a:chOff x="1096443" y="224328"/>
-            <a:chExt cx="7824120" cy="5029210"/>
+            <a:chOff x="529242" y="108152"/>
+            <a:chExt cx="10994165" cy="6641695"/>
           </a:xfrm>
         </p:grpSpPr>
-        <p:pic>
-          <p:nvPicPr>
-            <p:cNvPr id="5" name="Picture 4">
+        <p:grpSp>
+          <p:nvGrpSpPr>
+            <p:cNvPr id="8" name="Group 7">
               <a:extLst>
                 <a:ext uri="{FF2B5EF4-FFF2-40B4-BE49-F238E27FC236}">
-                  <a16:creationId xmlns:a16="http://schemas.microsoft.com/office/drawing/2014/main" id="{D47DE283-D403-8867-2B33-9720C49230F5}"/>
+                  <a16:creationId xmlns:a16="http://schemas.microsoft.com/office/drawing/2014/main" id="{1F06B398-46B1-BF0E-8B08-EE7D0AFD3263}"/>
                 </a:ext>
               </a:extLst>
             </p:cNvPr>
-            <p:cNvPicPr>
-              <a:picLocks noChangeAspect="1"/>
-            </p:cNvPicPr>
+            <p:cNvGrpSpPr/>
             <p:nvPr/>
-          </p:nvPicPr>
-          <p:blipFill>
-            <a:blip r:embed="rId2">
-              <a:clrChange>
-                <a:clrFrom>
-                  <a:srgbClr val="FFFFFF"/>
-                </a:clrFrom>
-                <a:clrTo>
-                  <a:srgbClr val="FFFFFF">
-                    <a:alpha val="0"/>
-                  </a:srgbClr>
-                </a:clrTo>
-              </a:clrChange>
+          </p:nvGrpSpPr>
+          <p:grpSpPr>
+            <a:xfrm>
+              <a:off x="529242" y="108152"/>
+              <a:ext cx="10994165" cy="6641695"/>
+              <a:chOff x="1096443" y="224328"/>
+              <a:chExt cx="7824120" cy="5029210"/>
+            </a:xfrm>
+          </p:grpSpPr>
+          <p:pic>
+            <p:nvPicPr>
+              <p:cNvPr id="5" name="Picture 4">
+                <a:extLst>
+                  <a:ext uri="{FF2B5EF4-FFF2-40B4-BE49-F238E27FC236}">
+                    <a16:creationId xmlns:a16="http://schemas.microsoft.com/office/drawing/2014/main" id="{D47DE283-D403-8867-2B33-9720C49230F5}"/>
+                  </a:ext>
+                </a:extLst>
+              </p:cNvPr>
+              <p:cNvPicPr>
+                <a:picLocks noChangeAspect="1"/>
+              </p:cNvPicPr>
+              <p:nvPr/>
+            </p:nvPicPr>
+            <p:blipFill>
+              <a:blip r:embed="rId2">
+                <a:clrChange>
+                  <a:clrFrom>
+                    <a:srgbClr val="FFFFFF"/>
+                  </a:clrFrom>
+                  <a:clrTo>
+                    <a:srgbClr val="FFFFFF">
+                      <a:alpha val="0"/>
+                    </a:srgbClr>
+                  </a:clrTo>
+                </a:clrChange>
+                <a:extLst>
+                  <a:ext uri="{28A0092B-C50C-407E-A947-70E740481C1C}">
+                    <a14:useLocalDpi xmlns:a14="http://schemas.microsoft.com/office/drawing/2010/main" val="0"/>
+                  </a:ext>
+                </a:extLst>
+              </a:blip>
+              <a:srcRect/>
+              <a:stretch/>
+            </p:blipFill>
+            <p:spPr>
+              <a:xfrm>
+                <a:off x="1096443" y="224328"/>
+                <a:ext cx="6302181" cy="5029210"/>
+              </a:xfrm>
+              <a:prstGeom prst="rect">
+                <a:avLst/>
+              </a:prstGeom>
+            </p:spPr>
+          </p:pic>
+          <p:pic>
+            <p:nvPicPr>
+              <p:cNvPr id="7" name="Picture 6" descr="A screenshot of a computer&#10;&#10;Description automatically generated">
+                <a:extLst>
+                  <a:ext uri="{FF2B5EF4-FFF2-40B4-BE49-F238E27FC236}">
+                    <a16:creationId xmlns:a16="http://schemas.microsoft.com/office/drawing/2014/main" id="{96A80E76-5B08-D624-3289-E5DFA9FD509D}"/>
+                  </a:ext>
+                </a:extLst>
+              </p:cNvPr>
+              <p:cNvPicPr>
+                <a:picLocks noChangeAspect="1"/>
+              </p:cNvPicPr>
+              <p:nvPr/>
+            </p:nvPicPr>
+            <p:blipFill>
+              <a:blip r:embed="rId3">
+                <a:clrChange>
+                  <a:clrFrom>
+                    <a:srgbClr val="FFFFFF"/>
+                  </a:clrFrom>
+                  <a:clrTo>
+                    <a:srgbClr val="FFFFFF">
+                      <a:alpha val="0"/>
+                    </a:srgbClr>
+                  </a:clrTo>
+                </a:clrChange>
+                <a:extLst>
+                  <a:ext uri="{28A0092B-C50C-407E-A947-70E740481C1C}">
+                    <a14:useLocalDpi xmlns:a14="http://schemas.microsoft.com/office/drawing/2010/main" val="0"/>
+                  </a:ext>
+                </a:extLst>
+              </a:blip>
+              <a:stretch>
+                <a:fillRect/>
+              </a:stretch>
+            </p:blipFill>
+            <p:spPr>
+              <a:xfrm>
+                <a:off x="7381320" y="1229027"/>
+                <a:ext cx="1539243" cy="3019812"/>
+              </a:xfrm>
+              <a:prstGeom prst="rect">
+                <a:avLst/>
+              </a:prstGeom>
+            </p:spPr>
+          </p:pic>
+        </p:grpSp>
+        <p:sp>
+          <p:nvSpPr>
+            <p:cNvPr id="2" name="TextBox 1">
               <a:extLst>
-                <a:ext uri="{28A0092B-C50C-407E-A947-70E740481C1C}">
-                  <a14:useLocalDpi xmlns:a14="http://schemas.microsoft.com/office/drawing/2010/main" val="0"/>
+                <a:ext uri="{FF2B5EF4-FFF2-40B4-BE49-F238E27FC236}">
+                  <a16:creationId xmlns:a16="http://schemas.microsoft.com/office/drawing/2014/main" id="{2794FC12-E5A3-4AE7-8709-30E2F77801AB}"/>
                 </a:ext>
               </a:extLst>
-            </a:blip>
-            <a:srcRect/>
-            <a:stretch/>
-          </p:blipFill>
+            </p:cNvPr>
+            <p:cNvSpPr txBox="1"/>
+            <p:nvPr/>
+          </p:nvSpPr>
           <p:spPr>
             <a:xfrm>
-              <a:off x="1096443" y="224328"/>
-              <a:ext cx="6302182" cy="5029210"/>
+              <a:off x="9307288" y="6363092"/>
+              <a:ext cx="155092" cy="276999"/>
             </a:xfrm>
             <a:prstGeom prst="rect">
               <a:avLst/>
             </a:prstGeom>
+            <a:noFill/>
           </p:spPr>
-        </p:pic>
-        <p:pic>
-          <p:nvPicPr>
-            <p:cNvPr id="7" name="Picture 6" descr="A screenshot of a computer&#10;&#10;Description automatically generated">
-              <a:extLst>
-                <a:ext uri="{FF2B5EF4-FFF2-40B4-BE49-F238E27FC236}">
-                  <a16:creationId xmlns:a16="http://schemas.microsoft.com/office/drawing/2014/main" id="{96A80E76-5B08-D624-3289-E5DFA9FD509D}"/>
-                </a:ext>
-              </a:extLst>
-            </p:cNvPr>
-            <p:cNvPicPr>
-              <a:picLocks noChangeAspect="1"/>
-            </p:cNvPicPr>
-            <p:nvPr/>
-          </p:nvPicPr>
-          <p:blipFill>
-            <a:blip r:embed="rId3">
-              <a:clrChange>
-                <a:clrFrom>
-                  <a:srgbClr val="FFFFFF"/>
-                </a:clrFrom>
-                <a:clrTo>
-                  <a:srgbClr val="FFFFFF">
-                    <a:alpha val="0"/>
-                  </a:srgbClr>
-                </a:clrTo>
-              </a:clrChange>
-              <a:extLst>
-                <a:ext uri="{28A0092B-C50C-407E-A947-70E740481C1C}">
-                  <a14:useLocalDpi xmlns:a14="http://schemas.microsoft.com/office/drawing/2010/main" val="0"/>
-                </a:ext>
-              </a:extLst>
-            </a:blip>
-            <a:stretch>
-              <a:fillRect/>
-            </a:stretch>
-          </p:blipFill>
-          <p:spPr>
-            <a:xfrm>
-              <a:off x="7381320" y="1229027"/>
-              <a:ext cx="1539243" cy="3019812"/>
-            </a:xfrm>
-            <a:prstGeom prst="rect">
-              <a:avLst/>
-            </a:prstGeom>
-          </p:spPr>
-        </p:pic>
+          <p:txBody>
+            <a:bodyPr wrap="square" rtlCol="0">
+              <a:spAutoFit/>
+            </a:bodyPr>
+            <a:lstStyle/>
+            <a:p>
+              <a:r>
+                <a:rPr lang="en-US" sz="1200" dirty="0"/>
+                <a:t>d</a:t>
+              </a:r>
+            </a:p>
+          </p:txBody>
+        </p:sp>
       </p:grpSp>
     </p:spTree>
     <p:extLst>

</xml_diff>